<commit_message>
Funcionando MDNS, OTA y WifiManager
</commit_message>
<xml_diff>
--- a/DOC/NA_FCB1010Wifi.pptx
+++ b/DOC/NA_FCB1010Wifi.pptx
@@ -290,7 +290,7 @@
             <a:fld id="{7A847CFC-816F-41D0-AAC0-9BF4FEBC753E}" type="datetimeFigureOut">
               <a:rPr lang="es-ES" smtClean="0"/>
               <a:pPr/>
-              <a:t>24/10/16</a:t>
+              <a:t>30/12/2017</a:t>
             </a:fld>
             <a:endParaRPr lang="es-ES"/>
           </a:p>
@@ -457,7 +457,7 @@
             <a:fld id="{7A847CFC-816F-41D0-AAC0-9BF4FEBC753E}" type="datetimeFigureOut">
               <a:rPr lang="es-ES" smtClean="0"/>
               <a:pPr/>
-              <a:t>24/10/16</a:t>
+              <a:t>30/12/2017</a:t>
             </a:fld>
             <a:endParaRPr lang="es-ES"/>
           </a:p>
@@ -634,7 +634,7 @@
             <a:fld id="{7A847CFC-816F-41D0-AAC0-9BF4FEBC753E}" type="datetimeFigureOut">
               <a:rPr lang="es-ES" smtClean="0"/>
               <a:pPr/>
-              <a:t>24/10/16</a:t>
+              <a:t>30/12/2017</a:t>
             </a:fld>
             <a:endParaRPr lang="es-ES"/>
           </a:p>
@@ -801,7 +801,7 @@
             <a:fld id="{7A847CFC-816F-41D0-AAC0-9BF4FEBC753E}" type="datetimeFigureOut">
               <a:rPr lang="es-ES" smtClean="0"/>
               <a:pPr/>
-              <a:t>24/10/16</a:t>
+              <a:t>30/12/2017</a:t>
             </a:fld>
             <a:endParaRPr lang="es-ES"/>
           </a:p>
@@ -1044,7 +1044,7 @@
             <a:fld id="{7A847CFC-816F-41D0-AAC0-9BF4FEBC753E}" type="datetimeFigureOut">
               <a:rPr lang="es-ES" smtClean="0"/>
               <a:pPr/>
-              <a:t>24/10/16</a:t>
+              <a:t>30/12/2017</a:t>
             </a:fld>
             <a:endParaRPr lang="es-ES"/>
           </a:p>
@@ -1329,7 +1329,7 @@
             <a:fld id="{7A847CFC-816F-41D0-AAC0-9BF4FEBC753E}" type="datetimeFigureOut">
               <a:rPr lang="es-ES" smtClean="0"/>
               <a:pPr/>
-              <a:t>24/10/16</a:t>
+              <a:t>30/12/2017</a:t>
             </a:fld>
             <a:endParaRPr lang="es-ES"/>
           </a:p>
@@ -1748,7 +1748,7 @@
             <a:fld id="{7A847CFC-816F-41D0-AAC0-9BF4FEBC753E}" type="datetimeFigureOut">
               <a:rPr lang="es-ES" smtClean="0"/>
               <a:pPr/>
-              <a:t>24/10/16</a:t>
+              <a:t>30/12/2017</a:t>
             </a:fld>
             <a:endParaRPr lang="es-ES"/>
           </a:p>
@@ -1863,7 +1863,7 @@
             <a:fld id="{7A847CFC-816F-41D0-AAC0-9BF4FEBC753E}" type="datetimeFigureOut">
               <a:rPr lang="es-ES" smtClean="0"/>
               <a:pPr/>
-              <a:t>24/10/16</a:t>
+              <a:t>30/12/2017</a:t>
             </a:fld>
             <a:endParaRPr lang="es-ES"/>
           </a:p>
@@ -1955,7 +1955,7 @@
             <a:fld id="{7A847CFC-816F-41D0-AAC0-9BF4FEBC753E}" type="datetimeFigureOut">
               <a:rPr lang="es-ES" smtClean="0"/>
               <a:pPr/>
-              <a:t>24/10/16</a:t>
+              <a:t>30/12/2017</a:t>
             </a:fld>
             <a:endParaRPr lang="es-ES"/>
           </a:p>
@@ -2229,7 +2229,7 @@
             <a:fld id="{7A847CFC-816F-41D0-AAC0-9BF4FEBC753E}" type="datetimeFigureOut">
               <a:rPr lang="es-ES" smtClean="0"/>
               <a:pPr/>
-              <a:t>24/10/16</a:t>
+              <a:t>30/12/2017</a:t>
             </a:fld>
             <a:endParaRPr lang="es-ES"/>
           </a:p>
@@ -2479,7 +2479,7 @@
             <a:fld id="{7A847CFC-816F-41D0-AAC0-9BF4FEBC753E}" type="datetimeFigureOut">
               <a:rPr lang="es-ES" smtClean="0"/>
               <a:pPr/>
-              <a:t>24/10/16</a:t>
+              <a:t>30/12/2017</a:t>
             </a:fld>
             <a:endParaRPr lang="es-ES"/>
           </a:p>
@@ -2689,7 +2689,7 @@
             <a:fld id="{7A847CFC-816F-41D0-AAC0-9BF4FEBC753E}" type="datetimeFigureOut">
               <a:rPr lang="es-ES" smtClean="0"/>
               <a:pPr/>
-              <a:t>24/10/16</a:t>
+              <a:t>30/12/2017</a:t>
             </a:fld>
             <a:endParaRPr lang="es-ES"/>
           </a:p>
@@ -3963,6 +3963,94 @@
           </p:style>
         </p:cxnSp>
       </p:grpSp>
+      <p:sp>
+        <p:nvSpPr>
+          <p:cNvPr id="45" name="44 CuadroTexto"/>
+          <p:cNvSpPr txBox="1"/>
+          <p:nvPr/>
+        </p:nvSpPr>
+        <p:spPr>
+          <a:xfrm>
+            <a:off x="4865353" y="2902725"/>
+            <a:ext cx="444352" cy="307777"/>
+          </a:xfrm>
+          <a:prstGeom prst="rect">
+            <a:avLst/>
+          </a:prstGeom>
+          <a:noFill/>
+        </p:spPr>
+        <p:txBody>
+          <a:bodyPr wrap="none" rtlCol="0">
+            <a:spAutoFit/>
+          </a:bodyPr>
+          <a:lstStyle/>
+          <a:p>
+            <a:r>
+              <a:rPr lang="es-ES" sz="1400" dirty="0" smtClean="0"/>
+              <a:t>gris</a:t>
+            </a:r>
+            <a:endParaRPr lang="es-ES" sz="1400" dirty="0"/>
+          </a:p>
+        </p:txBody>
+      </p:sp>
+      <p:sp>
+        <p:nvSpPr>
+          <p:cNvPr id="46" name="45 CuadroTexto"/>
+          <p:cNvSpPr txBox="1"/>
+          <p:nvPr/>
+        </p:nvSpPr>
+        <p:spPr>
+          <a:xfrm>
+            <a:off x="2074736" y="4967299"/>
+            <a:ext cx="673711" cy="307777"/>
+          </a:xfrm>
+          <a:prstGeom prst="rect">
+            <a:avLst/>
+          </a:prstGeom>
+          <a:noFill/>
+        </p:spPr>
+        <p:txBody>
+          <a:bodyPr wrap="none" rtlCol="0">
+            <a:spAutoFit/>
+          </a:bodyPr>
+          <a:lstStyle/>
+          <a:p>
+            <a:r>
+              <a:rPr lang="es-ES" sz="1400" dirty="0" smtClean="0"/>
+              <a:t>Blanco</a:t>
+            </a:r>
+          </a:p>
+        </p:txBody>
+      </p:sp>
+      <p:sp>
+        <p:nvSpPr>
+          <p:cNvPr id="47" name="46 CuadroTexto"/>
+          <p:cNvSpPr txBox="1"/>
+          <p:nvPr/>
+        </p:nvSpPr>
+        <p:spPr>
+          <a:xfrm>
+            <a:off x="2098089" y="5176937"/>
+            <a:ext cx="629018" cy="307777"/>
+          </a:xfrm>
+          <a:prstGeom prst="rect">
+            <a:avLst/>
+          </a:prstGeom>
+          <a:noFill/>
+        </p:spPr>
+        <p:txBody>
+          <a:bodyPr wrap="none" rtlCol="0">
+            <a:spAutoFit/>
+          </a:bodyPr>
+          <a:lstStyle/>
+          <a:p>
+            <a:r>
+              <a:rPr lang="es-ES" sz="1400" dirty="0" smtClean="0"/>
+              <a:t>Negro</a:t>
+            </a:r>
+          </a:p>
+        </p:txBody>
+      </p:sp>
     </p:spTree>
   </p:cSld>
   <p:clrMapOvr>

</xml_diff>